<commit_message>
Sterlizied the presentation for general use.
</commit_message>
<xml_diff>
--- a/1. Infrastructure & Tools.pptx
+++ b/1. Infrastructure & Tools.pptx
@@ -5,41 +5,41 @@
     <p:sldMasterId id="2147483659" r:id="rId1"/>
   </p:sldMasterIdLst>
   <p:notesMasterIdLst>
-    <p:notesMasterId r:id="rId20"/>
+    <p:notesMasterId r:id="rId19"/>
   </p:notesMasterIdLst>
   <p:sldIdLst>
     <p:sldId id="270" r:id="rId2"/>
-    <p:sldId id="273" r:id="rId3"/>
-    <p:sldId id="271" r:id="rId4"/>
-    <p:sldId id="272" r:id="rId5"/>
-    <p:sldId id="256" r:id="rId6"/>
-    <p:sldId id="257" r:id="rId7"/>
-    <p:sldId id="258" r:id="rId8"/>
-    <p:sldId id="259" r:id="rId9"/>
-    <p:sldId id="260" r:id="rId10"/>
-    <p:sldId id="261" r:id="rId11"/>
-    <p:sldId id="262" r:id="rId12"/>
-    <p:sldId id="263" r:id="rId13"/>
-    <p:sldId id="264" r:id="rId14"/>
-    <p:sldId id="265" r:id="rId15"/>
-    <p:sldId id="266" r:id="rId16"/>
-    <p:sldId id="267" r:id="rId17"/>
-    <p:sldId id="268" r:id="rId18"/>
-    <p:sldId id="269" r:id="rId19"/>
+    <p:sldId id="271" r:id="rId3"/>
+    <p:sldId id="272" r:id="rId4"/>
+    <p:sldId id="256" r:id="rId5"/>
+    <p:sldId id="257" r:id="rId6"/>
+    <p:sldId id="258" r:id="rId7"/>
+    <p:sldId id="259" r:id="rId8"/>
+    <p:sldId id="260" r:id="rId9"/>
+    <p:sldId id="261" r:id="rId10"/>
+    <p:sldId id="262" r:id="rId11"/>
+    <p:sldId id="263" r:id="rId12"/>
+    <p:sldId id="264" r:id="rId13"/>
+    <p:sldId id="265" r:id="rId14"/>
+    <p:sldId id="266" r:id="rId15"/>
+    <p:sldId id="267" r:id="rId16"/>
+    <p:sldId id="268" r:id="rId17"/>
+    <p:sldId id="269" r:id="rId18"/>
   </p:sldIdLst>
   <p:sldSz cx="9144000" cy="6858000" type="screen4x3"/>
   <p:notesSz cx="6858000" cy="9144000"/>
   <p:embeddedFontLst>
     <p:embeddedFont>
       <p:font typeface="Amatic SC" pitchFamily="2" charset="-79"/>
-      <p:regular r:id="rId21"/>
-      <p:bold r:id="rId22"/>
+      <p:regular r:id="rId20"/>
+      <p:bold r:id="rId21"/>
     </p:embeddedFont>
     <p:embeddedFont>
       <p:font typeface="Source Code Pro" panose="020B0509030403020204" pitchFamily="49" charset="0"/>
-      <p:regular r:id="rId23"/>
-      <p:bold r:id="rId24"/>
-      <p:italic r:id="rId25"/>
+      <p:regular r:id="rId22"/>
+      <p:bold r:id="rId23"/>
+      <p:italic r:id="rId24"/>
+      <p:boldItalic r:id="rId25"/>
     </p:embeddedFont>
   </p:embeddedFontLst>
   <p:defaultTextStyle>
@@ -2892,546 +2892,6 @@
 </file>
 
 <file path=ppt/slideLayouts/slideLayout10.xml><?xml version="1.0" encoding="utf-8"?>
-<p:sldLayout xmlns:a="http://schemas.openxmlformats.org/drawingml/2006/main" xmlns:r="http://schemas.openxmlformats.org/officeDocument/2006/relationships" xmlns:p="http://schemas.openxmlformats.org/presentationml/2006/main" matchingName="Big number">
-  <p:cSld name="BIG_NUMBER">
-    <p:spTree>
-      <p:nvGrpSpPr>
-        <p:cNvPr id="1" name="Shape 46"/>
-        <p:cNvGrpSpPr/>
-        <p:nvPr/>
-      </p:nvGrpSpPr>
-      <p:grpSpPr>
-        <a:xfrm>
-          <a:off x="0" y="0"/>
-          <a:ext cx="0" cy="0"/>
-          <a:chOff x="0" y="0"/>
-          <a:chExt cx="0" cy="0"/>
-        </a:xfrm>
-      </p:grpSpPr>
-      <p:sp>
-        <p:nvSpPr>
-          <p:cNvPr id="47" name="Google Shape;47;p11"/>
-          <p:cNvSpPr txBox="1">
-            <a:spLocks noGrp="1"/>
-          </p:cNvSpPr>
-          <p:nvPr>
-            <p:ph type="title" hasCustomPrompt="1"/>
-          </p:nvPr>
-        </p:nvSpPr>
-        <p:spPr>
-          <a:xfrm>
-            <a:off x="311700" y="1653700"/>
-            <a:ext cx="8520600" cy="2642400"/>
-          </a:xfrm>
-          <a:prstGeom prst="rect">
-            <a:avLst/>
-          </a:prstGeom>
-        </p:spPr>
-        <p:txBody>
-          <a:bodyPr spcFirstLastPara="1" wrap="square" lIns="91425" tIns="91425" rIns="91425" bIns="91425" anchor="b" anchorCtr="0"/>
-          <a:lstStyle>
-            <a:lvl1pPr lvl="0" algn="ctr">
-              <a:spcBef>
-                <a:spcPts val="0"/>
-              </a:spcBef>
-              <a:spcAft>
-                <a:spcPts val="0"/>
-              </a:spcAft>
-              <a:buClr>
-                <a:schemeClr val="lt1"/>
-              </a:buClr>
-              <a:buSzPts val="12000"/>
-              <a:buNone/>
-              <a:defRPr sz="12000">
-                <a:solidFill>
-                  <a:schemeClr val="lt1"/>
-                </a:solidFill>
-                <a:highlight>
-                  <a:schemeClr val="accent1"/>
-                </a:highlight>
-              </a:defRPr>
-            </a:lvl1pPr>
-            <a:lvl2pPr lvl="1" algn="ctr">
-              <a:spcBef>
-                <a:spcPts val="0"/>
-              </a:spcBef>
-              <a:spcAft>
-                <a:spcPts val="0"/>
-              </a:spcAft>
-              <a:buClr>
-                <a:schemeClr val="lt1"/>
-              </a:buClr>
-              <a:buSzPts val="12000"/>
-              <a:buNone/>
-              <a:defRPr sz="12000">
-                <a:solidFill>
-                  <a:schemeClr val="lt1"/>
-                </a:solidFill>
-                <a:highlight>
-                  <a:schemeClr val="accent1"/>
-                </a:highlight>
-              </a:defRPr>
-            </a:lvl2pPr>
-            <a:lvl3pPr lvl="2" algn="ctr">
-              <a:spcBef>
-                <a:spcPts val="0"/>
-              </a:spcBef>
-              <a:spcAft>
-                <a:spcPts val="0"/>
-              </a:spcAft>
-              <a:buClr>
-                <a:schemeClr val="lt1"/>
-              </a:buClr>
-              <a:buSzPts val="12000"/>
-              <a:buNone/>
-              <a:defRPr sz="12000">
-                <a:solidFill>
-                  <a:schemeClr val="lt1"/>
-                </a:solidFill>
-                <a:highlight>
-                  <a:schemeClr val="accent1"/>
-                </a:highlight>
-              </a:defRPr>
-            </a:lvl3pPr>
-            <a:lvl4pPr lvl="3" algn="ctr">
-              <a:spcBef>
-                <a:spcPts val="0"/>
-              </a:spcBef>
-              <a:spcAft>
-                <a:spcPts val="0"/>
-              </a:spcAft>
-              <a:buClr>
-                <a:schemeClr val="lt1"/>
-              </a:buClr>
-              <a:buSzPts val="12000"/>
-              <a:buNone/>
-              <a:defRPr sz="12000">
-                <a:solidFill>
-                  <a:schemeClr val="lt1"/>
-                </a:solidFill>
-                <a:highlight>
-                  <a:schemeClr val="accent1"/>
-                </a:highlight>
-              </a:defRPr>
-            </a:lvl4pPr>
-            <a:lvl5pPr lvl="4" algn="ctr">
-              <a:spcBef>
-                <a:spcPts val="0"/>
-              </a:spcBef>
-              <a:spcAft>
-                <a:spcPts val="0"/>
-              </a:spcAft>
-              <a:buClr>
-                <a:schemeClr val="lt1"/>
-              </a:buClr>
-              <a:buSzPts val="12000"/>
-              <a:buNone/>
-              <a:defRPr sz="12000">
-                <a:solidFill>
-                  <a:schemeClr val="lt1"/>
-                </a:solidFill>
-                <a:highlight>
-                  <a:schemeClr val="accent1"/>
-                </a:highlight>
-              </a:defRPr>
-            </a:lvl5pPr>
-            <a:lvl6pPr lvl="5" algn="ctr">
-              <a:spcBef>
-                <a:spcPts val="0"/>
-              </a:spcBef>
-              <a:spcAft>
-                <a:spcPts val="0"/>
-              </a:spcAft>
-              <a:buClr>
-                <a:schemeClr val="lt1"/>
-              </a:buClr>
-              <a:buSzPts val="12000"/>
-              <a:buNone/>
-              <a:defRPr sz="12000">
-                <a:solidFill>
-                  <a:schemeClr val="lt1"/>
-                </a:solidFill>
-                <a:highlight>
-                  <a:schemeClr val="accent1"/>
-                </a:highlight>
-              </a:defRPr>
-            </a:lvl6pPr>
-            <a:lvl7pPr lvl="6" algn="ctr">
-              <a:spcBef>
-                <a:spcPts val="0"/>
-              </a:spcBef>
-              <a:spcAft>
-                <a:spcPts val="0"/>
-              </a:spcAft>
-              <a:buClr>
-                <a:schemeClr val="lt1"/>
-              </a:buClr>
-              <a:buSzPts val="12000"/>
-              <a:buNone/>
-              <a:defRPr sz="12000">
-                <a:solidFill>
-                  <a:schemeClr val="lt1"/>
-                </a:solidFill>
-                <a:highlight>
-                  <a:schemeClr val="accent1"/>
-                </a:highlight>
-              </a:defRPr>
-            </a:lvl7pPr>
-            <a:lvl8pPr lvl="7" algn="ctr">
-              <a:spcBef>
-                <a:spcPts val="0"/>
-              </a:spcBef>
-              <a:spcAft>
-                <a:spcPts val="0"/>
-              </a:spcAft>
-              <a:buClr>
-                <a:schemeClr val="lt1"/>
-              </a:buClr>
-              <a:buSzPts val="12000"/>
-              <a:buNone/>
-              <a:defRPr sz="12000">
-                <a:solidFill>
-                  <a:schemeClr val="lt1"/>
-                </a:solidFill>
-                <a:highlight>
-                  <a:schemeClr val="accent1"/>
-                </a:highlight>
-              </a:defRPr>
-            </a:lvl8pPr>
-            <a:lvl9pPr lvl="8" algn="ctr">
-              <a:spcBef>
-                <a:spcPts val="0"/>
-              </a:spcBef>
-              <a:spcAft>
-                <a:spcPts val="0"/>
-              </a:spcAft>
-              <a:buClr>
-                <a:schemeClr val="lt1"/>
-              </a:buClr>
-              <a:buSzPts val="12000"/>
-              <a:buNone/>
-              <a:defRPr sz="12000">
-                <a:solidFill>
-                  <a:schemeClr val="lt1"/>
-                </a:solidFill>
-                <a:highlight>
-                  <a:schemeClr val="accent1"/>
-                </a:highlight>
-              </a:defRPr>
-            </a:lvl9pPr>
-          </a:lstStyle>
-          <a:p>
-            <a:r>
-              <a:t>xx%</a:t>
-            </a:r>
-          </a:p>
-        </p:txBody>
-      </p:sp>
-      <p:sp>
-        <p:nvSpPr>
-          <p:cNvPr id="48" name="Google Shape;48;p11"/>
-          <p:cNvSpPr txBox="1">
-            <a:spLocks noGrp="1"/>
-          </p:cNvSpPr>
-          <p:nvPr>
-            <p:ph type="body" idx="1"/>
-          </p:nvPr>
-        </p:nvSpPr>
-        <p:spPr>
-          <a:xfrm>
-            <a:off x="311700" y="4406167"/>
-            <a:ext cx="8520600" cy="1734300"/>
-          </a:xfrm>
-          <a:prstGeom prst="rect">
-            <a:avLst/>
-          </a:prstGeom>
-        </p:spPr>
-        <p:txBody>
-          <a:bodyPr spcFirstLastPara="1" wrap="square" lIns="91425" tIns="91425" rIns="91425" bIns="91425" anchor="t" anchorCtr="0"/>
-          <a:lstStyle>
-            <a:lvl1pPr marL="457200" lvl="0" indent="-342900" algn="ctr">
-              <a:spcBef>
-                <a:spcPts val="0"/>
-              </a:spcBef>
-              <a:spcAft>
-                <a:spcPts val="0"/>
-              </a:spcAft>
-              <a:buClr>
-                <a:schemeClr val="accent1"/>
-              </a:buClr>
-              <a:buSzPts val="1800"/>
-              <a:buChar char="●"/>
-              <a:defRPr>
-                <a:solidFill>
-                  <a:schemeClr val="accent1"/>
-                </a:solidFill>
-                <a:highlight>
-                  <a:schemeClr val="dk1"/>
-                </a:highlight>
-              </a:defRPr>
-            </a:lvl1pPr>
-            <a:lvl2pPr marL="914400" lvl="1" indent="-317500" algn="ctr">
-              <a:spcBef>
-                <a:spcPts val="1600"/>
-              </a:spcBef>
-              <a:spcAft>
-                <a:spcPts val="0"/>
-              </a:spcAft>
-              <a:buClr>
-                <a:schemeClr val="accent1"/>
-              </a:buClr>
-              <a:buSzPts val="1400"/>
-              <a:buChar char="○"/>
-              <a:defRPr>
-                <a:solidFill>
-                  <a:schemeClr val="accent1"/>
-                </a:solidFill>
-                <a:highlight>
-                  <a:schemeClr val="dk1"/>
-                </a:highlight>
-              </a:defRPr>
-            </a:lvl2pPr>
-            <a:lvl3pPr marL="1371600" lvl="2" indent="-317500" algn="ctr">
-              <a:spcBef>
-                <a:spcPts val="1600"/>
-              </a:spcBef>
-              <a:spcAft>
-                <a:spcPts val="0"/>
-              </a:spcAft>
-              <a:buClr>
-                <a:schemeClr val="accent1"/>
-              </a:buClr>
-              <a:buSzPts val="1400"/>
-              <a:buChar char="■"/>
-              <a:defRPr>
-                <a:solidFill>
-                  <a:schemeClr val="accent1"/>
-                </a:solidFill>
-                <a:highlight>
-                  <a:schemeClr val="dk1"/>
-                </a:highlight>
-              </a:defRPr>
-            </a:lvl3pPr>
-            <a:lvl4pPr marL="1828800" lvl="3" indent="-317500" algn="ctr">
-              <a:spcBef>
-                <a:spcPts val="1600"/>
-              </a:spcBef>
-              <a:spcAft>
-                <a:spcPts val="0"/>
-              </a:spcAft>
-              <a:buClr>
-                <a:schemeClr val="accent1"/>
-              </a:buClr>
-              <a:buSzPts val="1400"/>
-              <a:buChar char="●"/>
-              <a:defRPr>
-                <a:solidFill>
-                  <a:schemeClr val="accent1"/>
-                </a:solidFill>
-                <a:highlight>
-                  <a:schemeClr val="dk1"/>
-                </a:highlight>
-              </a:defRPr>
-            </a:lvl4pPr>
-            <a:lvl5pPr marL="2286000" lvl="4" indent="-317500" algn="ctr">
-              <a:spcBef>
-                <a:spcPts val="1600"/>
-              </a:spcBef>
-              <a:spcAft>
-                <a:spcPts val="0"/>
-              </a:spcAft>
-              <a:buClr>
-                <a:schemeClr val="accent1"/>
-              </a:buClr>
-              <a:buSzPts val="1400"/>
-              <a:buChar char="○"/>
-              <a:defRPr>
-                <a:solidFill>
-                  <a:schemeClr val="accent1"/>
-                </a:solidFill>
-                <a:highlight>
-                  <a:schemeClr val="dk1"/>
-                </a:highlight>
-              </a:defRPr>
-            </a:lvl5pPr>
-            <a:lvl6pPr marL="2743200" lvl="5" indent="-317500" algn="ctr">
-              <a:spcBef>
-                <a:spcPts val="1600"/>
-              </a:spcBef>
-              <a:spcAft>
-                <a:spcPts val="0"/>
-              </a:spcAft>
-              <a:buClr>
-                <a:schemeClr val="accent1"/>
-              </a:buClr>
-              <a:buSzPts val="1400"/>
-              <a:buChar char="■"/>
-              <a:defRPr>
-                <a:solidFill>
-                  <a:schemeClr val="accent1"/>
-                </a:solidFill>
-                <a:highlight>
-                  <a:schemeClr val="dk1"/>
-                </a:highlight>
-              </a:defRPr>
-            </a:lvl6pPr>
-            <a:lvl7pPr marL="3200400" lvl="6" indent="-317500" algn="ctr">
-              <a:spcBef>
-                <a:spcPts val="1600"/>
-              </a:spcBef>
-              <a:spcAft>
-                <a:spcPts val="0"/>
-              </a:spcAft>
-              <a:buClr>
-                <a:schemeClr val="accent1"/>
-              </a:buClr>
-              <a:buSzPts val="1400"/>
-              <a:buChar char="●"/>
-              <a:defRPr>
-                <a:solidFill>
-                  <a:schemeClr val="accent1"/>
-                </a:solidFill>
-                <a:highlight>
-                  <a:schemeClr val="dk1"/>
-                </a:highlight>
-              </a:defRPr>
-            </a:lvl7pPr>
-            <a:lvl8pPr marL="3657600" lvl="7" indent="-317500" algn="ctr">
-              <a:spcBef>
-                <a:spcPts val="1600"/>
-              </a:spcBef>
-              <a:spcAft>
-                <a:spcPts val="0"/>
-              </a:spcAft>
-              <a:buClr>
-                <a:schemeClr val="accent1"/>
-              </a:buClr>
-              <a:buSzPts val="1400"/>
-              <a:buChar char="○"/>
-              <a:defRPr>
-                <a:solidFill>
-                  <a:schemeClr val="accent1"/>
-                </a:solidFill>
-                <a:highlight>
-                  <a:schemeClr val="dk1"/>
-                </a:highlight>
-              </a:defRPr>
-            </a:lvl8pPr>
-            <a:lvl9pPr marL="4114800" lvl="8" indent="-317500" algn="ctr">
-              <a:spcBef>
-                <a:spcPts val="1600"/>
-              </a:spcBef>
-              <a:spcAft>
-                <a:spcPts val="1600"/>
-              </a:spcAft>
-              <a:buClr>
-                <a:schemeClr val="accent1"/>
-              </a:buClr>
-              <a:buSzPts val="1400"/>
-              <a:buChar char="■"/>
-              <a:defRPr>
-                <a:solidFill>
-                  <a:schemeClr val="accent1"/>
-                </a:solidFill>
-                <a:highlight>
-                  <a:schemeClr val="dk1"/>
-                </a:highlight>
-              </a:defRPr>
-            </a:lvl9pPr>
-          </a:lstStyle>
-          <a:p>
-            <a:endParaRPr/>
-          </a:p>
-        </p:txBody>
-      </p:sp>
-      <p:sp>
-        <p:nvSpPr>
-          <p:cNvPr id="49" name="Google Shape;49;p11"/>
-          <p:cNvSpPr txBox="1">
-            <a:spLocks noGrp="1"/>
-          </p:cNvSpPr>
-          <p:nvPr>
-            <p:ph type="sldNum" idx="12"/>
-          </p:nvPr>
-        </p:nvSpPr>
-        <p:spPr>
-          <a:xfrm>
-            <a:off x="8472458" y="6217622"/>
-            <a:ext cx="548700" cy="524700"/>
-          </a:xfrm>
-          <a:prstGeom prst="rect">
-            <a:avLst/>
-          </a:prstGeom>
-        </p:spPr>
-        <p:txBody>
-          <a:bodyPr spcFirstLastPara="1" wrap="square" lIns="91425" tIns="91425" rIns="91425" bIns="91425" anchor="ctr" anchorCtr="0">
-            <a:noAutofit/>
-          </a:bodyPr>
-          <a:lstStyle>
-            <a:lvl1pPr lvl="0">
-              <a:buNone/>
-              <a:defRPr/>
-            </a:lvl1pPr>
-            <a:lvl2pPr lvl="1">
-              <a:buNone/>
-              <a:defRPr/>
-            </a:lvl2pPr>
-            <a:lvl3pPr lvl="2">
-              <a:buNone/>
-              <a:defRPr/>
-            </a:lvl3pPr>
-            <a:lvl4pPr lvl="3">
-              <a:buNone/>
-              <a:defRPr/>
-            </a:lvl4pPr>
-            <a:lvl5pPr lvl="4">
-              <a:buNone/>
-              <a:defRPr/>
-            </a:lvl5pPr>
-            <a:lvl6pPr lvl="5">
-              <a:buNone/>
-              <a:defRPr/>
-            </a:lvl6pPr>
-            <a:lvl7pPr lvl="6">
-              <a:buNone/>
-              <a:defRPr/>
-            </a:lvl7pPr>
-            <a:lvl8pPr lvl="7">
-              <a:buNone/>
-              <a:defRPr/>
-            </a:lvl8pPr>
-            <a:lvl9pPr lvl="8">
-              <a:buNone/>
-              <a:defRPr/>
-            </a:lvl9pPr>
-          </a:lstStyle>
-          <a:p>
-            <a:pPr marL="0" lvl="0" indent="0" algn="r" rtl="0">
-              <a:spcBef>
-                <a:spcPts val="0"/>
-              </a:spcBef>
-              <a:spcAft>
-                <a:spcPts val="0"/>
-              </a:spcAft>
-              <a:buNone/>
-            </a:pPr>
-            <a:fld id="{00000000-1234-1234-1234-123412341234}" type="slidenum">
-              <a:rPr lang="en"/>
-              <a:t>‹#›</a:t>
-            </a:fld>
-            <a:endParaRPr/>
-          </a:p>
-        </p:txBody>
-      </p:sp>
-    </p:spTree>
-  </p:cSld>
-  <p:clrMapOvr>
-    <a:masterClrMapping/>
-  </p:clrMapOvr>
-</p:sldLayout>
-</file>
-
-<file path=ppt/slideLayouts/slideLayout11.xml><?xml version="1.0" encoding="utf-8"?>
 <p:sldLayout xmlns:a="http://schemas.openxmlformats.org/drawingml/2006/main" xmlns:r="http://schemas.openxmlformats.org/officeDocument/2006/relationships" xmlns:p="http://schemas.openxmlformats.org/presentationml/2006/main" matchingName="Blank" type="blank">
   <p:cSld name="BLANK">
     <p:spTree>
@@ -4613,237 +4073,6 @@
 </file>
 
 <file path=ppt/slideLayouts/slideLayout5.xml><?xml version="1.0" encoding="utf-8"?>
-<p:sldLayout xmlns:a="http://schemas.openxmlformats.org/drawingml/2006/main" xmlns:r="http://schemas.openxmlformats.org/officeDocument/2006/relationships" xmlns:p="http://schemas.openxmlformats.org/presentationml/2006/main" matchingName="Title only" type="titleOnly">
-  <p:cSld name="TITLE_ONLY">
-    <p:spTree>
-      <p:nvGrpSpPr>
-        <p:cNvPr id="1" name="Shape 26"/>
-        <p:cNvGrpSpPr/>
-        <p:nvPr/>
-      </p:nvGrpSpPr>
-      <p:grpSpPr>
-        <a:xfrm>
-          <a:off x="0" y="0"/>
-          <a:ext cx="0" cy="0"/>
-          <a:chOff x="0" y="0"/>
-          <a:chExt cx="0" cy="0"/>
-        </a:xfrm>
-      </p:grpSpPr>
-      <p:sp>
-        <p:nvSpPr>
-          <p:cNvPr id="27" name="Google Shape;27;p6"/>
-          <p:cNvSpPr txBox="1">
-            <a:spLocks noGrp="1"/>
-          </p:cNvSpPr>
-          <p:nvPr>
-            <p:ph type="title"/>
-          </p:nvPr>
-        </p:nvSpPr>
-        <p:spPr>
-          <a:xfrm>
-            <a:off x="304800" y="412467"/>
-            <a:ext cx="8537700" cy="997500"/>
-          </a:xfrm>
-          <a:prstGeom prst="rect">
-            <a:avLst/>
-          </a:prstGeom>
-        </p:spPr>
-        <p:txBody>
-          <a:bodyPr spcFirstLastPara="1" wrap="square" lIns="91425" tIns="91425" rIns="91425" bIns="91425" anchor="t" anchorCtr="0"/>
-          <a:lstStyle>
-            <a:lvl1pPr lvl="0">
-              <a:spcBef>
-                <a:spcPts val="0"/>
-              </a:spcBef>
-              <a:spcAft>
-                <a:spcPts val="0"/>
-              </a:spcAft>
-              <a:buSzPts val="4000"/>
-              <a:buNone/>
-              <a:defRPr sz="4000"/>
-            </a:lvl1pPr>
-            <a:lvl2pPr lvl="1">
-              <a:spcBef>
-                <a:spcPts val="0"/>
-              </a:spcBef>
-              <a:spcAft>
-                <a:spcPts val="0"/>
-              </a:spcAft>
-              <a:buSzPts val="4000"/>
-              <a:buNone/>
-              <a:defRPr sz="4000"/>
-            </a:lvl2pPr>
-            <a:lvl3pPr lvl="2">
-              <a:spcBef>
-                <a:spcPts val="0"/>
-              </a:spcBef>
-              <a:spcAft>
-                <a:spcPts val="0"/>
-              </a:spcAft>
-              <a:buSzPts val="4000"/>
-              <a:buNone/>
-              <a:defRPr sz="4000"/>
-            </a:lvl3pPr>
-            <a:lvl4pPr lvl="3">
-              <a:spcBef>
-                <a:spcPts val="0"/>
-              </a:spcBef>
-              <a:spcAft>
-                <a:spcPts val="0"/>
-              </a:spcAft>
-              <a:buSzPts val="4000"/>
-              <a:buNone/>
-              <a:defRPr sz="4000"/>
-            </a:lvl4pPr>
-            <a:lvl5pPr lvl="4">
-              <a:spcBef>
-                <a:spcPts val="0"/>
-              </a:spcBef>
-              <a:spcAft>
-                <a:spcPts val="0"/>
-              </a:spcAft>
-              <a:buSzPts val="4000"/>
-              <a:buNone/>
-              <a:defRPr sz="4000"/>
-            </a:lvl5pPr>
-            <a:lvl6pPr lvl="5">
-              <a:spcBef>
-                <a:spcPts val="0"/>
-              </a:spcBef>
-              <a:spcAft>
-                <a:spcPts val="0"/>
-              </a:spcAft>
-              <a:buSzPts val="4000"/>
-              <a:buNone/>
-              <a:defRPr sz="4000"/>
-            </a:lvl6pPr>
-            <a:lvl7pPr lvl="6">
-              <a:spcBef>
-                <a:spcPts val="0"/>
-              </a:spcBef>
-              <a:spcAft>
-                <a:spcPts val="0"/>
-              </a:spcAft>
-              <a:buSzPts val="4000"/>
-              <a:buNone/>
-              <a:defRPr sz="4000"/>
-            </a:lvl7pPr>
-            <a:lvl8pPr lvl="7">
-              <a:spcBef>
-                <a:spcPts val="0"/>
-              </a:spcBef>
-              <a:spcAft>
-                <a:spcPts val="0"/>
-              </a:spcAft>
-              <a:buSzPts val="4000"/>
-              <a:buNone/>
-              <a:defRPr sz="4000"/>
-            </a:lvl8pPr>
-            <a:lvl9pPr lvl="8">
-              <a:spcBef>
-                <a:spcPts val="0"/>
-              </a:spcBef>
-              <a:spcAft>
-                <a:spcPts val="0"/>
-              </a:spcAft>
-              <a:buSzPts val="4000"/>
-              <a:buNone/>
-              <a:defRPr sz="4000"/>
-            </a:lvl9pPr>
-          </a:lstStyle>
-          <a:p>
-            <a:endParaRPr/>
-          </a:p>
-        </p:txBody>
-      </p:sp>
-      <p:sp>
-        <p:nvSpPr>
-          <p:cNvPr id="28" name="Google Shape;28;p6"/>
-          <p:cNvSpPr txBox="1">
-            <a:spLocks noGrp="1"/>
-          </p:cNvSpPr>
-          <p:nvPr>
-            <p:ph type="sldNum" idx="12"/>
-          </p:nvPr>
-        </p:nvSpPr>
-        <p:spPr>
-          <a:xfrm>
-            <a:off x="8472458" y="6217622"/>
-            <a:ext cx="548700" cy="524700"/>
-          </a:xfrm>
-          <a:prstGeom prst="rect">
-            <a:avLst/>
-          </a:prstGeom>
-        </p:spPr>
-        <p:txBody>
-          <a:bodyPr spcFirstLastPara="1" wrap="square" lIns="91425" tIns="91425" rIns="91425" bIns="91425" anchor="ctr" anchorCtr="0">
-            <a:noAutofit/>
-          </a:bodyPr>
-          <a:lstStyle>
-            <a:lvl1pPr lvl="0">
-              <a:buNone/>
-              <a:defRPr/>
-            </a:lvl1pPr>
-            <a:lvl2pPr lvl="1">
-              <a:buNone/>
-              <a:defRPr/>
-            </a:lvl2pPr>
-            <a:lvl3pPr lvl="2">
-              <a:buNone/>
-              <a:defRPr/>
-            </a:lvl3pPr>
-            <a:lvl4pPr lvl="3">
-              <a:buNone/>
-              <a:defRPr/>
-            </a:lvl4pPr>
-            <a:lvl5pPr lvl="4">
-              <a:buNone/>
-              <a:defRPr/>
-            </a:lvl5pPr>
-            <a:lvl6pPr lvl="5">
-              <a:buNone/>
-              <a:defRPr/>
-            </a:lvl6pPr>
-            <a:lvl7pPr lvl="6">
-              <a:buNone/>
-              <a:defRPr/>
-            </a:lvl7pPr>
-            <a:lvl8pPr lvl="7">
-              <a:buNone/>
-              <a:defRPr/>
-            </a:lvl8pPr>
-            <a:lvl9pPr lvl="8">
-              <a:buNone/>
-              <a:defRPr/>
-            </a:lvl9pPr>
-          </a:lstStyle>
-          <a:p>
-            <a:pPr marL="0" lvl="0" indent="0" algn="r" rtl="0">
-              <a:spcBef>
-                <a:spcPts val="0"/>
-              </a:spcBef>
-              <a:spcAft>
-                <a:spcPts val="0"/>
-              </a:spcAft>
-              <a:buNone/>
-            </a:pPr>
-            <a:fld id="{00000000-1234-1234-1234-123412341234}" type="slidenum">
-              <a:rPr lang="en"/>
-              <a:t>‹#›</a:t>
-            </a:fld>
-            <a:endParaRPr/>
-          </a:p>
-        </p:txBody>
-      </p:sp>
-    </p:spTree>
-  </p:cSld>
-  <p:clrMapOvr>
-    <a:masterClrMapping/>
-  </p:clrMapOvr>
-</p:sldLayout>
-</file>
-
-<file path=ppt/slideLayouts/slideLayout6.xml><?xml version="1.0" encoding="utf-8"?>
 <p:sldLayout xmlns:a="http://schemas.openxmlformats.org/drawingml/2006/main" xmlns:r="http://schemas.openxmlformats.org/officeDocument/2006/relationships" xmlns:p="http://schemas.openxmlformats.org/presentationml/2006/main" matchingName="One column text">
   <p:cSld name="ONE_COLUMN_TEXT">
     <p:spTree>
@@ -5237,7 +4466,7 @@
 </p:sldLayout>
 </file>
 
-<file path=ppt/slideLayouts/slideLayout7.xml><?xml version="1.0" encoding="utf-8"?>
+<file path=ppt/slideLayouts/slideLayout6.xml><?xml version="1.0" encoding="utf-8"?>
 <p:sldLayout xmlns:a="http://schemas.openxmlformats.org/drawingml/2006/main" xmlns:r="http://schemas.openxmlformats.org/officeDocument/2006/relationships" xmlns:p="http://schemas.openxmlformats.org/presentationml/2006/main" matchingName="Main point">
   <p:cSld name="MAIN_POINT">
     <p:spTree>
@@ -5567,7 +4796,7 @@
 </p:sldLayout>
 </file>
 
-<file path=ppt/slideLayouts/slideLayout8.xml><?xml version="1.0" encoding="utf-8"?>
+<file path=ppt/slideLayouts/slideLayout7.xml><?xml version="1.0" encoding="utf-8"?>
 <p:sldLayout xmlns:a="http://schemas.openxmlformats.org/drawingml/2006/main" xmlns:r="http://schemas.openxmlformats.org/officeDocument/2006/relationships" xmlns:p="http://schemas.openxmlformats.org/presentationml/2006/main" matchingName="Section title and description">
   <p:cSld name="SECTION_TITLE_AND_DESCRIPTION">
     <p:spTree>
@@ -6235,7 +5464,7 @@
 </p:sldLayout>
 </file>
 
-<file path=ppt/slideLayouts/slideLayout9.xml><?xml version="1.0" encoding="utf-8"?>
+<file path=ppt/slideLayouts/slideLayout8.xml><?xml version="1.0" encoding="utf-8"?>
 <p:sldLayout xmlns:a="http://schemas.openxmlformats.org/drawingml/2006/main" xmlns:r="http://schemas.openxmlformats.org/officeDocument/2006/relationships" xmlns:p="http://schemas.openxmlformats.org/presentationml/2006/main" matchingName="Caption">
   <p:cSld name="CAPTION_ONLY">
     <p:spTree>
@@ -6309,6 +5538,546 @@
       <p:sp>
         <p:nvSpPr>
           <p:cNvPr id="45" name="Google Shape;45;p10"/>
+          <p:cNvSpPr txBox="1">
+            <a:spLocks noGrp="1"/>
+          </p:cNvSpPr>
+          <p:nvPr>
+            <p:ph type="sldNum" idx="12"/>
+          </p:nvPr>
+        </p:nvSpPr>
+        <p:spPr>
+          <a:xfrm>
+            <a:off x="8472458" y="6217622"/>
+            <a:ext cx="548700" cy="524700"/>
+          </a:xfrm>
+          <a:prstGeom prst="rect">
+            <a:avLst/>
+          </a:prstGeom>
+        </p:spPr>
+        <p:txBody>
+          <a:bodyPr spcFirstLastPara="1" wrap="square" lIns="91425" tIns="91425" rIns="91425" bIns="91425" anchor="ctr" anchorCtr="0">
+            <a:noAutofit/>
+          </a:bodyPr>
+          <a:lstStyle>
+            <a:lvl1pPr lvl="0">
+              <a:buNone/>
+              <a:defRPr/>
+            </a:lvl1pPr>
+            <a:lvl2pPr lvl="1">
+              <a:buNone/>
+              <a:defRPr/>
+            </a:lvl2pPr>
+            <a:lvl3pPr lvl="2">
+              <a:buNone/>
+              <a:defRPr/>
+            </a:lvl3pPr>
+            <a:lvl4pPr lvl="3">
+              <a:buNone/>
+              <a:defRPr/>
+            </a:lvl4pPr>
+            <a:lvl5pPr lvl="4">
+              <a:buNone/>
+              <a:defRPr/>
+            </a:lvl5pPr>
+            <a:lvl6pPr lvl="5">
+              <a:buNone/>
+              <a:defRPr/>
+            </a:lvl6pPr>
+            <a:lvl7pPr lvl="6">
+              <a:buNone/>
+              <a:defRPr/>
+            </a:lvl7pPr>
+            <a:lvl8pPr lvl="7">
+              <a:buNone/>
+              <a:defRPr/>
+            </a:lvl8pPr>
+            <a:lvl9pPr lvl="8">
+              <a:buNone/>
+              <a:defRPr/>
+            </a:lvl9pPr>
+          </a:lstStyle>
+          <a:p>
+            <a:pPr marL="0" lvl="0" indent="0" algn="r" rtl="0">
+              <a:spcBef>
+                <a:spcPts val="0"/>
+              </a:spcBef>
+              <a:spcAft>
+                <a:spcPts val="0"/>
+              </a:spcAft>
+              <a:buNone/>
+            </a:pPr>
+            <a:fld id="{00000000-1234-1234-1234-123412341234}" type="slidenum">
+              <a:rPr lang="en"/>
+              <a:t>‹#›</a:t>
+            </a:fld>
+            <a:endParaRPr/>
+          </a:p>
+        </p:txBody>
+      </p:sp>
+    </p:spTree>
+  </p:cSld>
+  <p:clrMapOvr>
+    <a:masterClrMapping/>
+  </p:clrMapOvr>
+</p:sldLayout>
+</file>
+
+<file path=ppt/slideLayouts/slideLayout9.xml><?xml version="1.0" encoding="utf-8"?>
+<p:sldLayout xmlns:a="http://schemas.openxmlformats.org/drawingml/2006/main" xmlns:r="http://schemas.openxmlformats.org/officeDocument/2006/relationships" xmlns:p="http://schemas.openxmlformats.org/presentationml/2006/main" matchingName="Big number">
+  <p:cSld name="BIG_NUMBER">
+    <p:spTree>
+      <p:nvGrpSpPr>
+        <p:cNvPr id="1" name="Shape 46"/>
+        <p:cNvGrpSpPr/>
+        <p:nvPr/>
+      </p:nvGrpSpPr>
+      <p:grpSpPr>
+        <a:xfrm>
+          <a:off x="0" y="0"/>
+          <a:ext cx="0" cy="0"/>
+          <a:chOff x="0" y="0"/>
+          <a:chExt cx="0" cy="0"/>
+        </a:xfrm>
+      </p:grpSpPr>
+      <p:sp>
+        <p:nvSpPr>
+          <p:cNvPr id="47" name="Google Shape;47;p11"/>
+          <p:cNvSpPr txBox="1">
+            <a:spLocks noGrp="1"/>
+          </p:cNvSpPr>
+          <p:nvPr>
+            <p:ph type="title" hasCustomPrompt="1"/>
+          </p:nvPr>
+        </p:nvSpPr>
+        <p:spPr>
+          <a:xfrm>
+            <a:off x="311700" y="1653700"/>
+            <a:ext cx="8520600" cy="2642400"/>
+          </a:xfrm>
+          <a:prstGeom prst="rect">
+            <a:avLst/>
+          </a:prstGeom>
+        </p:spPr>
+        <p:txBody>
+          <a:bodyPr spcFirstLastPara="1" wrap="square" lIns="91425" tIns="91425" rIns="91425" bIns="91425" anchor="b" anchorCtr="0"/>
+          <a:lstStyle>
+            <a:lvl1pPr lvl="0" algn="ctr">
+              <a:spcBef>
+                <a:spcPts val="0"/>
+              </a:spcBef>
+              <a:spcAft>
+                <a:spcPts val="0"/>
+              </a:spcAft>
+              <a:buClr>
+                <a:schemeClr val="lt1"/>
+              </a:buClr>
+              <a:buSzPts val="12000"/>
+              <a:buNone/>
+              <a:defRPr sz="12000">
+                <a:solidFill>
+                  <a:schemeClr val="lt1"/>
+                </a:solidFill>
+                <a:highlight>
+                  <a:schemeClr val="accent1"/>
+                </a:highlight>
+              </a:defRPr>
+            </a:lvl1pPr>
+            <a:lvl2pPr lvl="1" algn="ctr">
+              <a:spcBef>
+                <a:spcPts val="0"/>
+              </a:spcBef>
+              <a:spcAft>
+                <a:spcPts val="0"/>
+              </a:spcAft>
+              <a:buClr>
+                <a:schemeClr val="lt1"/>
+              </a:buClr>
+              <a:buSzPts val="12000"/>
+              <a:buNone/>
+              <a:defRPr sz="12000">
+                <a:solidFill>
+                  <a:schemeClr val="lt1"/>
+                </a:solidFill>
+                <a:highlight>
+                  <a:schemeClr val="accent1"/>
+                </a:highlight>
+              </a:defRPr>
+            </a:lvl2pPr>
+            <a:lvl3pPr lvl="2" algn="ctr">
+              <a:spcBef>
+                <a:spcPts val="0"/>
+              </a:spcBef>
+              <a:spcAft>
+                <a:spcPts val="0"/>
+              </a:spcAft>
+              <a:buClr>
+                <a:schemeClr val="lt1"/>
+              </a:buClr>
+              <a:buSzPts val="12000"/>
+              <a:buNone/>
+              <a:defRPr sz="12000">
+                <a:solidFill>
+                  <a:schemeClr val="lt1"/>
+                </a:solidFill>
+                <a:highlight>
+                  <a:schemeClr val="accent1"/>
+                </a:highlight>
+              </a:defRPr>
+            </a:lvl3pPr>
+            <a:lvl4pPr lvl="3" algn="ctr">
+              <a:spcBef>
+                <a:spcPts val="0"/>
+              </a:spcBef>
+              <a:spcAft>
+                <a:spcPts val="0"/>
+              </a:spcAft>
+              <a:buClr>
+                <a:schemeClr val="lt1"/>
+              </a:buClr>
+              <a:buSzPts val="12000"/>
+              <a:buNone/>
+              <a:defRPr sz="12000">
+                <a:solidFill>
+                  <a:schemeClr val="lt1"/>
+                </a:solidFill>
+                <a:highlight>
+                  <a:schemeClr val="accent1"/>
+                </a:highlight>
+              </a:defRPr>
+            </a:lvl4pPr>
+            <a:lvl5pPr lvl="4" algn="ctr">
+              <a:spcBef>
+                <a:spcPts val="0"/>
+              </a:spcBef>
+              <a:spcAft>
+                <a:spcPts val="0"/>
+              </a:spcAft>
+              <a:buClr>
+                <a:schemeClr val="lt1"/>
+              </a:buClr>
+              <a:buSzPts val="12000"/>
+              <a:buNone/>
+              <a:defRPr sz="12000">
+                <a:solidFill>
+                  <a:schemeClr val="lt1"/>
+                </a:solidFill>
+                <a:highlight>
+                  <a:schemeClr val="accent1"/>
+                </a:highlight>
+              </a:defRPr>
+            </a:lvl5pPr>
+            <a:lvl6pPr lvl="5" algn="ctr">
+              <a:spcBef>
+                <a:spcPts val="0"/>
+              </a:spcBef>
+              <a:spcAft>
+                <a:spcPts val="0"/>
+              </a:spcAft>
+              <a:buClr>
+                <a:schemeClr val="lt1"/>
+              </a:buClr>
+              <a:buSzPts val="12000"/>
+              <a:buNone/>
+              <a:defRPr sz="12000">
+                <a:solidFill>
+                  <a:schemeClr val="lt1"/>
+                </a:solidFill>
+                <a:highlight>
+                  <a:schemeClr val="accent1"/>
+                </a:highlight>
+              </a:defRPr>
+            </a:lvl6pPr>
+            <a:lvl7pPr lvl="6" algn="ctr">
+              <a:spcBef>
+                <a:spcPts val="0"/>
+              </a:spcBef>
+              <a:spcAft>
+                <a:spcPts val="0"/>
+              </a:spcAft>
+              <a:buClr>
+                <a:schemeClr val="lt1"/>
+              </a:buClr>
+              <a:buSzPts val="12000"/>
+              <a:buNone/>
+              <a:defRPr sz="12000">
+                <a:solidFill>
+                  <a:schemeClr val="lt1"/>
+                </a:solidFill>
+                <a:highlight>
+                  <a:schemeClr val="accent1"/>
+                </a:highlight>
+              </a:defRPr>
+            </a:lvl7pPr>
+            <a:lvl8pPr lvl="7" algn="ctr">
+              <a:spcBef>
+                <a:spcPts val="0"/>
+              </a:spcBef>
+              <a:spcAft>
+                <a:spcPts val="0"/>
+              </a:spcAft>
+              <a:buClr>
+                <a:schemeClr val="lt1"/>
+              </a:buClr>
+              <a:buSzPts val="12000"/>
+              <a:buNone/>
+              <a:defRPr sz="12000">
+                <a:solidFill>
+                  <a:schemeClr val="lt1"/>
+                </a:solidFill>
+                <a:highlight>
+                  <a:schemeClr val="accent1"/>
+                </a:highlight>
+              </a:defRPr>
+            </a:lvl8pPr>
+            <a:lvl9pPr lvl="8" algn="ctr">
+              <a:spcBef>
+                <a:spcPts val="0"/>
+              </a:spcBef>
+              <a:spcAft>
+                <a:spcPts val="0"/>
+              </a:spcAft>
+              <a:buClr>
+                <a:schemeClr val="lt1"/>
+              </a:buClr>
+              <a:buSzPts val="12000"/>
+              <a:buNone/>
+              <a:defRPr sz="12000">
+                <a:solidFill>
+                  <a:schemeClr val="lt1"/>
+                </a:solidFill>
+                <a:highlight>
+                  <a:schemeClr val="accent1"/>
+                </a:highlight>
+              </a:defRPr>
+            </a:lvl9pPr>
+          </a:lstStyle>
+          <a:p>
+            <a:r>
+              <a:t>xx%</a:t>
+            </a:r>
+          </a:p>
+        </p:txBody>
+      </p:sp>
+      <p:sp>
+        <p:nvSpPr>
+          <p:cNvPr id="48" name="Google Shape;48;p11"/>
+          <p:cNvSpPr txBox="1">
+            <a:spLocks noGrp="1"/>
+          </p:cNvSpPr>
+          <p:nvPr>
+            <p:ph type="body" idx="1"/>
+          </p:nvPr>
+        </p:nvSpPr>
+        <p:spPr>
+          <a:xfrm>
+            <a:off x="311700" y="4406167"/>
+            <a:ext cx="8520600" cy="1734300"/>
+          </a:xfrm>
+          <a:prstGeom prst="rect">
+            <a:avLst/>
+          </a:prstGeom>
+        </p:spPr>
+        <p:txBody>
+          <a:bodyPr spcFirstLastPara="1" wrap="square" lIns="91425" tIns="91425" rIns="91425" bIns="91425" anchor="t" anchorCtr="0"/>
+          <a:lstStyle>
+            <a:lvl1pPr marL="457200" lvl="0" indent="-342900" algn="ctr">
+              <a:spcBef>
+                <a:spcPts val="0"/>
+              </a:spcBef>
+              <a:spcAft>
+                <a:spcPts val="0"/>
+              </a:spcAft>
+              <a:buClr>
+                <a:schemeClr val="accent1"/>
+              </a:buClr>
+              <a:buSzPts val="1800"/>
+              <a:buChar char="●"/>
+              <a:defRPr>
+                <a:solidFill>
+                  <a:schemeClr val="accent1"/>
+                </a:solidFill>
+                <a:highlight>
+                  <a:schemeClr val="dk1"/>
+                </a:highlight>
+              </a:defRPr>
+            </a:lvl1pPr>
+            <a:lvl2pPr marL="914400" lvl="1" indent="-317500" algn="ctr">
+              <a:spcBef>
+                <a:spcPts val="1600"/>
+              </a:spcBef>
+              <a:spcAft>
+                <a:spcPts val="0"/>
+              </a:spcAft>
+              <a:buClr>
+                <a:schemeClr val="accent1"/>
+              </a:buClr>
+              <a:buSzPts val="1400"/>
+              <a:buChar char="○"/>
+              <a:defRPr>
+                <a:solidFill>
+                  <a:schemeClr val="accent1"/>
+                </a:solidFill>
+                <a:highlight>
+                  <a:schemeClr val="dk1"/>
+                </a:highlight>
+              </a:defRPr>
+            </a:lvl2pPr>
+            <a:lvl3pPr marL="1371600" lvl="2" indent="-317500" algn="ctr">
+              <a:spcBef>
+                <a:spcPts val="1600"/>
+              </a:spcBef>
+              <a:spcAft>
+                <a:spcPts val="0"/>
+              </a:spcAft>
+              <a:buClr>
+                <a:schemeClr val="accent1"/>
+              </a:buClr>
+              <a:buSzPts val="1400"/>
+              <a:buChar char="■"/>
+              <a:defRPr>
+                <a:solidFill>
+                  <a:schemeClr val="accent1"/>
+                </a:solidFill>
+                <a:highlight>
+                  <a:schemeClr val="dk1"/>
+                </a:highlight>
+              </a:defRPr>
+            </a:lvl3pPr>
+            <a:lvl4pPr marL="1828800" lvl="3" indent="-317500" algn="ctr">
+              <a:spcBef>
+                <a:spcPts val="1600"/>
+              </a:spcBef>
+              <a:spcAft>
+                <a:spcPts val="0"/>
+              </a:spcAft>
+              <a:buClr>
+                <a:schemeClr val="accent1"/>
+              </a:buClr>
+              <a:buSzPts val="1400"/>
+              <a:buChar char="●"/>
+              <a:defRPr>
+                <a:solidFill>
+                  <a:schemeClr val="accent1"/>
+                </a:solidFill>
+                <a:highlight>
+                  <a:schemeClr val="dk1"/>
+                </a:highlight>
+              </a:defRPr>
+            </a:lvl4pPr>
+            <a:lvl5pPr marL="2286000" lvl="4" indent="-317500" algn="ctr">
+              <a:spcBef>
+                <a:spcPts val="1600"/>
+              </a:spcBef>
+              <a:spcAft>
+                <a:spcPts val="0"/>
+              </a:spcAft>
+              <a:buClr>
+                <a:schemeClr val="accent1"/>
+              </a:buClr>
+              <a:buSzPts val="1400"/>
+              <a:buChar char="○"/>
+              <a:defRPr>
+                <a:solidFill>
+                  <a:schemeClr val="accent1"/>
+                </a:solidFill>
+                <a:highlight>
+                  <a:schemeClr val="dk1"/>
+                </a:highlight>
+              </a:defRPr>
+            </a:lvl5pPr>
+            <a:lvl6pPr marL="2743200" lvl="5" indent="-317500" algn="ctr">
+              <a:spcBef>
+                <a:spcPts val="1600"/>
+              </a:spcBef>
+              <a:spcAft>
+                <a:spcPts val="0"/>
+              </a:spcAft>
+              <a:buClr>
+                <a:schemeClr val="accent1"/>
+              </a:buClr>
+              <a:buSzPts val="1400"/>
+              <a:buChar char="■"/>
+              <a:defRPr>
+                <a:solidFill>
+                  <a:schemeClr val="accent1"/>
+                </a:solidFill>
+                <a:highlight>
+                  <a:schemeClr val="dk1"/>
+                </a:highlight>
+              </a:defRPr>
+            </a:lvl6pPr>
+            <a:lvl7pPr marL="3200400" lvl="6" indent="-317500" algn="ctr">
+              <a:spcBef>
+                <a:spcPts val="1600"/>
+              </a:spcBef>
+              <a:spcAft>
+                <a:spcPts val="0"/>
+              </a:spcAft>
+              <a:buClr>
+                <a:schemeClr val="accent1"/>
+              </a:buClr>
+              <a:buSzPts val="1400"/>
+              <a:buChar char="●"/>
+              <a:defRPr>
+                <a:solidFill>
+                  <a:schemeClr val="accent1"/>
+                </a:solidFill>
+                <a:highlight>
+                  <a:schemeClr val="dk1"/>
+                </a:highlight>
+              </a:defRPr>
+            </a:lvl7pPr>
+            <a:lvl8pPr marL="3657600" lvl="7" indent="-317500" algn="ctr">
+              <a:spcBef>
+                <a:spcPts val="1600"/>
+              </a:spcBef>
+              <a:spcAft>
+                <a:spcPts val="0"/>
+              </a:spcAft>
+              <a:buClr>
+                <a:schemeClr val="accent1"/>
+              </a:buClr>
+              <a:buSzPts val="1400"/>
+              <a:buChar char="○"/>
+              <a:defRPr>
+                <a:solidFill>
+                  <a:schemeClr val="accent1"/>
+                </a:solidFill>
+                <a:highlight>
+                  <a:schemeClr val="dk1"/>
+                </a:highlight>
+              </a:defRPr>
+            </a:lvl8pPr>
+            <a:lvl9pPr marL="4114800" lvl="8" indent="-317500" algn="ctr">
+              <a:spcBef>
+                <a:spcPts val="1600"/>
+              </a:spcBef>
+              <a:spcAft>
+                <a:spcPts val="1600"/>
+              </a:spcAft>
+              <a:buClr>
+                <a:schemeClr val="accent1"/>
+              </a:buClr>
+              <a:buSzPts val="1400"/>
+              <a:buChar char="■"/>
+              <a:defRPr>
+                <a:solidFill>
+                  <a:schemeClr val="accent1"/>
+                </a:solidFill>
+                <a:highlight>
+                  <a:schemeClr val="dk1"/>
+                </a:highlight>
+              </a:defRPr>
+            </a:lvl9pPr>
+          </a:lstStyle>
+          <a:p>
+            <a:endParaRPr/>
+          </a:p>
+        </p:txBody>
+      </p:sp>
+      <p:sp>
+        <p:nvSpPr>
+          <p:cNvPr id="49" name="Google Shape;49;p11"/>
           <p:cNvSpPr txBox="1">
             <a:spLocks noGrp="1"/>
           </p:cNvSpPr>
@@ -7086,13 +6855,12 @@
     <p:sldLayoutId id="2147483649" r:id="rId2"/>
     <p:sldLayoutId id="2147483650" r:id="rId3"/>
     <p:sldLayoutId id="2147483651" r:id="rId4"/>
-    <p:sldLayoutId id="2147483652" r:id="rId5"/>
-    <p:sldLayoutId id="2147483653" r:id="rId6"/>
-    <p:sldLayoutId id="2147483654" r:id="rId7"/>
-    <p:sldLayoutId id="2147483655" r:id="rId8"/>
-    <p:sldLayoutId id="2147483656" r:id="rId9"/>
-    <p:sldLayoutId id="2147483657" r:id="rId10"/>
-    <p:sldLayoutId id="2147483658" r:id="rId11"/>
+    <p:sldLayoutId id="2147483653" r:id="rId5"/>
+    <p:sldLayoutId id="2147483654" r:id="rId6"/>
+    <p:sldLayoutId id="2147483655" r:id="rId7"/>
+    <p:sldLayoutId id="2147483656" r:id="rId8"/>
+    <p:sldLayoutId id="2147483657" r:id="rId9"/>
+    <p:sldLayoutId id="2147483658" r:id="rId10"/>
   </p:sldLayoutIdLst>
   <p:hf sldNum="0" hdr="0" ftr="0" dt="0"/>
   <p:txStyles>
@@ -7840,7 +7608,7 @@
             </a:pPr>
             <a:r>
               <a:rPr lang="en" dirty="0"/>
-              <a:t>Thrivent Financial - October 2018</a:t>
+              <a:t>October 2018</a:t>
             </a:r>
             <a:endParaRPr dirty="0"/>
           </a:p>
@@ -7888,36 +7656,6 @@
           </a:p>
         </p:txBody>
       </p:sp>
-      <p:pic>
-        <p:nvPicPr>
-          <p:cNvPr id="3" name="Picture 2">
-            <a:extLst>
-              <a:ext uri="{FF2B5EF4-FFF2-40B4-BE49-F238E27FC236}">
-                <a16:creationId xmlns:a16="http://schemas.microsoft.com/office/drawing/2014/main" id="{711F9E88-CED3-4B34-AB36-A3B5CB06C0B9}"/>
-              </a:ext>
-            </a:extLst>
-          </p:cNvPr>
-          <p:cNvPicPr>
-            <a:picLocks noChangeAspect="1"/>
-          </p:cNvPicPr>
-          <p:nvPr/>
-        </p:nvPicPr>
-        <p:blipFill>
-          <a:blip r:embed="rId3"/>
-          <a:stretch>
-            <a:fillRect/>
-          </a:stretch>
-        </p:blipFill>
-        <p:spPr>
-          <a:xfrm>
-            <a:off x="2959510" y="1990244"/>
-            <a:ext cx="3224980" cy="2582554"/>
-          </a:xfrm>
-          <a:prstGeom prst="rect">
-            <a:avLst/>
-          </a:prstGeom>
-        </p:spPr>
-      </p:pic>
     </p:spTree>
     <p:extLst>
       <p:ext uri="{BB962C8B-B14F-4D97-AF65-F5344CB8AC3E}">
@@ -7932,267 +7670,6 @@
 </file>
 
 <file path=ppt/slides/slide10.xml><?xml version="1.0" encoding="utf-8"?>
-<p:sld xmlns:a="http://schemas.openxmlformats.org/drawingml/2006/main" xmlns:r="http://schemas.openxmlformats.org/officeDocument/2006/relationships" xmlns:p="http://schemas.openxmlformats.org/presentationml/2006/main">
-  <p:cSld>
-    <p:spTree>
-      <p:nvGrpSpPr>
-        <p:cNvPr id="1" name="Shape 87"/>
-        <p:cNvGrpSpPr/>
-        <p:nvPr/>
-      </p:nvGrpSpPr>
-      <p:grpSpPr>
-        <a:xfrm>
-          <a:off x="0" y="0"/>
-          <a:ext cx="0" cy="0"/>
-          <a:chOff x="0" y="0"/>
-          <a:chExt cx="0" cy="0"/>
-        </a:xfrm>
-      </p:grpSpPr>
-      <p:sp>
-        <p:nvSpPr>
-          <p:cNvPr id="88" name="Google Shape;88;p18"/>
-          <p:cNvSpPr txBox="1">
-            <a:spLocks noGrp="1"/>
-          </p:cNvSpPr>
-          <p:nvPr>
-            <p:ph type="body" idx="1"/>
-          </p:nvPr>
-        </p:nvSpPr>
-        <p:spPr>
-          <a:xfrm>
-            <a:off x="311700" y="1638233"/>
-            <a:ext cx="8520600" cy="4453500"/>
-          </a:xfrm>
-          <a:prstGeom prst="rect">
-            <a:avLst/>
-          </a:prstGeom>
-        </p:spPr>
-        <p:txBody>
-          <a:bodyPr spcFirstLastPara="1" wrap="square" lIns="91425" tIns="91425" rIns="91425" bIns="91425" anchor="t" anchorCtr="0">
-            <a:noAutofit/>
-          </a:bodyPr>
-          <a:lstStyle/>
-          <a:p>
-            <a:pPr marL="457200" lvl="0" indent="-342900" algn="l" rtl="0">
-              <a:spcBef>
-                <a:spcPts val="0"/>
-              </a:spcBef>
-              <a:spcAft>
-                <a:spcPts val="0"/>
-              </a:spcAft>
-              <a:buSzPts val="1800"/>
-              <a:buChar char="●"/>
-            </a:pPr>
-            <a:r>
-              <a:rPr lang="en"/>
-              <a:t>Like most open-source programming languages, there are many libraries written and supported for Python. </a:t>
-            </a:r>
-            <a:endParaRPr/>
-          </a:p>
-          <a:p>
-            <a:pPr marL="457200" lvl="0" indent="-342900" algn="l" rtl="0">
-              <a:spcBef>
-                <a:spcPts val="1000"/>
-              </a:spcBef>
-              <a:spcAft>
-                <a:spcPts val="0"/>
-              </a:spcAft>
-              <a:buSzPts val="1800"/>
-              <a:buChar char="●"/>
-            </a:pPr>
-            <a:r>
-              <a:rPr lang="en"/>
-              <a:t>Be careful with library version numbers for compatibility when sharing code and working in teams.</a:t>
-            </a:r>
-            <a:endParaRPr/>
-          </a:p>
-          <a:p>
-            <a:pPr marL="457200" lvl="0" indent="-342900" algn="l" rtl="0">
-              <a:spcBef>
-                <a:spcPts val="1000"/>
-              </a:spcBef>
-              <a:spcAft>
-                <a:spcPts val="0"/>
-              </a:spcAft>
-              <a:buSzPts val="1800"/>
-              <a:buChar char="●"/>
-            </a:pPr>
-            <a:r>
-              <a:rPr lang="en"/>
-              <a:t>You can use `pip freeze` to get a list of all libraries loaded and their version numbers</a:t>
-            </a:r>
-            <a:endParaRPr/>
-          </a:p>
-          <a:p>
-            <a:pPr marL="457200" lvl="0" indent="-342900" algn="l" rtl="0">
-              <a:spcBef>
-                <a:spcPts val="1000"/>
-              </a:spcBef>
-              <a:spcAft>
-                <a:spcPts val="0"/>
-              </a:spcAft>
-              <a:buSzPts val="1800"/>
-              <a:buChar char="●"/>
-            </a:pPr>
-            <a:r>
-              <a:rPr lang="en"/>
-              <a:t>Use Python environments to work with projects that have references to different library versions</a:t>
-            </a:r>
-            <a:endParaRPr/>
-          </a:p>
-          <a:p>
-            <a:pPr marL="457200" lvl="0" indent="-342900" algn="l" rtl="0">
-              <a:spcBef>
-                <a:spcPts val="1000"/>
-              </a:spcBef>
-              <a:spcAft>
-                <a:spcPts val="0"/>
-              </a:spcAft>
-              <a:buSzPts val="1800"/>
-              <a:buChar char="●"/>
-            </a:pPr>
-            <a:r>
-              <a:rPr lang="en"/>
-              <a:t>The Anaconda Distribution automatically installs the most commonly used data science packages:</a:t>
-            </a:r>
-            <a:endParaRPr/>
-          </a:p>
-          <a:p>
-            <a:pPr marL="914400" lvl="1" indent="-317500" algn="l" rtl="0">
-              <a:spcBef>
-                <a:spcPts val="1000"/>
-              </a:spcBef>
-              <a:spcAft>
-                <a:spcPts val="0"/>
-              </a:spcAft>
-              <a:buSzPts val="1400"/>
-              <a:buChar char="○"/>
-            </a:pPr>
-            <a:r>
-              <a:rPr lang="en"/>
-              <a:t>567 packages, according to the </a:t>
-            </a:r>
-            <a:r>
-              <a:rPr lang="en" u="sng">
-                <a:solidFill>
-                  <a:schemeClr val="hlink"/>
-                </a:solidFill>
-                <a:hlinkClick r:id="rId3"/>
-              </a:rPr>
-              <a:t>Anaconda website</a:t>
-            </a:r>
-            <a:endParaRPr/>
-          </a:p>
-          <a:p>
-            <a:pPr marL="914400" lvl="1" indent="-317500" algn="l" rtl="0">
-              <a:spcBef>
-                <a:spcPts val="1000"/>
-              </a:spcBef>
-              <a:spcAft>
-                <a:spcPts val="0"/>
-              </a:spcAft>
-              <a:buSzPts val="1400"/>
-              <a:buChar char="○"/>
-            </a:pPr>
-            <a:r>
-              <a:rPr lang="en"/>
-              <a:t>215 packages, according to my own `pip freeze` results</a:t>
-            </a:r>
-            <a:endParaRPr/>
-          </a:p>
-          <a:p>
-            <a:pPr marL="0" lvl="0" indent="0" algn="l" rtl="0">
-              <a:spcBef>
-                <a:spcPts val="1000"/>
-              </a:spcBef>
-              <a:spcAft>
-                <a:spcPts val="1000"/>
-              </a:spcAft>
-              <a:buNone/>
-            </a:pPr>
-            <a:endParaRPr/>
-          </a:p>
-        </p:txBody>
-      </p:sp>
-      <p:sp>
-        <p:nvSpPr>
-          <p:cNvPr id="89" name="Google Shape;89;p18"/>
-          <p:cNvSpPr txBox="1">
-            <a:spLocks noGrp="1"/>
-          </p:cNvSpPr>
-          <p:nvPr>
-            <p:ph type="title"/>
-          </p:nvPr>
-        </p:nvSpPr>
-        <p:spPr>
-          <a:xfrm>
-            <a:off x="311700" y="390467"/>
-            <a:ext cx="8520600" cy="1068000"/>
-          </a:xfrm>
-          <a:prstGeom prst="rect">
-            <a:avLst/>
-          </a:prstGeom>
-        </p:spPr>
-        <p:txBody>
-          <a:bodyPr spcFirstLastPara="1" wrap="square" lIns="91425" tIns="91425" rIns="91425" bIns="91425" anchor="t" anchorCtr="0">
-            <a:noAutofit/>
-          </a:bodyPr>
-          <a:lstStyle/>
-          <a:p>
-            <a:pPr marL="0" lvl="0" indent="0" algn="l" rtl="0">
-              <a:spcBef>
-                <a:spcPts val="0"/>
-              </a:spcBef>
-              <a:spcAft>
-                <a:spcPts val="0"/>
-              </a:spcAft>
-              <a:buNone/>
-            </a:pPr>
-            <a:r>
-              <a:rPr lang="en"/>
-              <a:t>Libraries</a:t>
-            </a:r>
-            <a:endParaRPr/>
-          </a:p>
-        </p:txBody>
-      </p:sp>
-      <p:pic>
-        <p:nvPicPr>
-          <p:cNvPr id="90" name="Google Shape;90;p18"/>
-          <p:cNvPicPr preferRelativeResize="0"/>
-          <p:nvPr/>
-        </p:nvPicPr>
-        <p:blipFill>
-          <a:blip r:embed="rId4">
-            <a:alphaModFix/>
-          </a:blip>
-          <a:stretch>
-            <a:fillRect/>
-          </a:stretch>
-        </p:blipFill>
-        <p:spPr>
-          <a:xfrm>
-            <a:off x="6847540" y="149450"/>
-            <a:ext cx="1561901" cy="1530025"/>
-          </a:xfrm>
-          <a:prstGeom prst="rect">
-            <a:avLst/>
-          </a:prstGeom>
-          <a:noFill/>
-          <a:ln>
-            <a:noFill/>
-          </a:ln>
-        </p:spPr>
-      </p:pic>
-    </p:spTree>
-  </p:cSld>
-  <p:clrMapOvr>
-    <a:masterClrMapping/>
-  </p:clrMapOvr>
-</p:sld>
-</file>
-
-<file path=ppt/slides/slide11.xml><?xml version="1.0" encoding="utf-8"?>
 <p:sld xmlns:a="http://schemas.openxmlformats.org/drawingml/2006/main" xmlns:r="http://schemas.openxmlformats.org/officeDocument/2006/relationships" xmlns:p="http://schemas.openxmlformats.org/presentationml/2006/main">
   <p:cSld>
     <p:spTree>
@@ -8422,7 +7899,7 @@
 </p:sld>
 </file>
 
-<file path=ppt/slides/slide12.xml><?xml version="1.0" encoding="utf-8"?>
+<file path=ppt/slides/slide11.xml><?xml version="1.0" encoding="utf-8"?>
 <p:sld xmlns:a="http://schemas.openxmlformats.org/drawingml/2006/main" xmlns:r="http://schemas.openxmlformats.org/officeDocument/2006/relationships" xmlns:p="http://schemas.openxmlformats.org/presentationml/2006/main">
   <p:cSld>
     <p:spTree>
@@ -8611,7 +8088,7 @@
 </p:sld>
 </file>
 
-<file path=ppt/slides/slide13.xml><?xml version="1.0" encoding="utf-8"?>
+<file path=ppt/slides/slide12.xml><?xml version="1.0" encoding="utf-8"?>
 <p:sld xmlns:a="http://schemas.openxmlformats.org/drawingml/2006/main" xmlns:r="http://schemas.openxmlformats.org/officeDocument/2006/relationships" xmlns:p="http://schemas.openxmlformats.org/presentationml/2006/main">
   <p:cSld>
     <p:spTree>
@@ -8664,7 +8141,7 @@
 </p:sld>
 </file>
 
-<file path=ppt/slides/slide14.xml><?xml version="1.0" encoding="utf-8"?>
+<file path=ppt/slides/slide13.xml><?xml version="1.0" encoding="utf-8"?>
 <p:sld xmlns:a="http://schemas.openxmlformats.org/drawingml/2006/main" xmlns:r="http://schemas.openxmlformats.org/officeDocument/2006/relationships" xmlns:p="http://schemas.openxmlformats.org/presentationml/2006/main">
   <p:cSld>
     <p:spTree>
@@ -8759,7 +8236,7 @@
 </p:sld>
 </file>
 
-<file path=ppt/slides/slide15.xml><?xml version="1.0" encoding="utf-8"?>
+<file path=ppt/slides/slide14.xml><?xml version="1.0" encoding="utf-8"?>
 <p:sld xmlns:a="http://schemas.openxmlformats.org/drawingml/2006/main" xmlns:r="http://schemas.openxmlformats.org/officeDocument/2006/relationships" xmlns:p="http://schemas.openxmlformats.org/presentationml/2006/main">
   <p:cSld>
     <p:spTree>
@@ -8812,7 +8289,7 @@
 </p:sld>
 </file>
 
-<file path=ppt/slides/slide16.xml><?xml version="1.0" encoding="utf-8"?>
+<file path=ppt/slides/slide15.xml><?xml version="1.0" encoding="utf-8"?>
 <p:sld xmlns:a="http://schemas.openxmlformats.org/drawingml/2006/main" xmlns:r="http://schemas.openxmlformats.org/officeDocument/2006/relationships" xmlns:p="http://schemas.openxmlformats.org/presentationml/2006/main">
   <p:cSld>
     <p:spTree>
@@ -9054,7 +8531,7 @@
 </p:sld>
 </file>
 
-<file path=ppt/slides/slide17.xml><?xml version="1.0" encoding="utf-8"?>
+<file path=ppt/slides/slide16.xml><?xml version="1.0" encoding="utf-8"?>
 <p:sld xmlns:a="http://schemas.openxmlformats.org/drawingml/2006/main" xmlns:r="http://schemas.openxmlformats.org/officeDocument/2006/relationships" xmlns:p="http://schemas.openxmlformats.org/presentationml/2006/main">
   <p:cSld>
     <p:spTree>
@@ -9448,7 +8925,7 @@
 </p:sld>
 </file>
 
-<file path=ppt/slides/slide18.xml><?xml version="1.0" encoding="utf-8"?>
+<file path=ppt/slides/slide17.xml><?xml version="1.0" encoding="utf-8"?>
 <p:sld xmlns:a="http://schemas.openxmlformats.org/drawingml/2006/main" xmlns:r="http://schemas.openxmlformats.org/officeDocument/2006/relationships" xmlns:p="http://schemas.openxmlformats.org/presentationml/2006/main">
   <p:cSld>
     <p:spTree>
@@ -9628,128 +9105,6 @@
 </file>
 
 <file path=ppt/slides/slide2.xml><?xml version="1.0" encoding="utf-8"?>
-<p:sld xmlns:a="http://schemas.openxmlformats.org/drawingml/2006/main" xmlns:r="http://schemas.openxmlformats.org/officeDocument/2006/relationships" xmlns:p="http://schemas.openxmlformats.org/presentationml/2006/main">
-  <p:cSld>
-    <p:spTree>
-      <p:nvGrpSpPr>
-        <p:cNvPr id="1" name=""/>
-        <p:cNvGrpSpPr/>
-        <p:nvPr/>
-      </p:nvGrpSpPr>
-      <p:grpSpPr>
-        <a:xfrm>
-          <a:off x="0" y="0"/>
-          <a:ext cx="0" cy="0"/>
-          <a:chOff x="0" y="0"/>
-          <a:chExt cx="0" cy="0"/>
-        </a:xfrm>
-      </p:grpSpPr>
-      <p:sp>
-        <p:nvSpPr>
-          <p:cNvPr id="2" name="Title 1">
-            <a:extLst>
-              <a:ext uri="{FF2B5EF4-FFF2-40B4-BE49-F238E27FC236}">
-                <a16:creationId xmlns:a16="http://schemas.microsoft.com/office/drawing/2014/main" id="{D00BB3CA-1614-4842-848F-037148A79A7F}"/>
-              </a:ext>
-            </a:extLst>
-          </p:cNvPr>
-          <p:cNvSpPr>
-            <a:spLocks noGrp="1"/>
-          </p:cNvSpPr>
-          <p:nvPr>
-            <p:ph type="title"/>
-          </p:nvPr>
-        </p:nvSpPr>
-        <p:spPr/>
-        <p:txBody>
-          <a:bodyPr/>
-          <a:lstStyle/>
-          <a:p>
-            <a:r>
-              <a:rPr lang="en-US" sz="3600" dirty="0"/>
-              <a:t>Warm and Friendly Welcome words from Kevin Courtney</a:t>
-            </a:r>
-          </a:p>
-        </p:txBody>
-      </p:sp>
-      <p:pic>
-        <p:nvPicPr>
-          <p:cNvPr id="4" name="Picture 3">
-            <a:extLst>
-              <a:ext uri="{FF2B5EF4-FFF2-40B4-BE49-F238E27FC236}">
-                <a16:creationId xmlns:a16="http://schemas.microsoft.com/office/drawing/2014/main" id="{F1E31851-0100-4D52-9EE7-F662C0596FB0}"/>
-              </a:ext>
-            </a:extLst>
-          </p:cNvPr>
-          <p:cNvPicPr>
-            <a:picLocks noChangeAspect="1"/>
-          </p:cNvPicPr>
-          <p:nvPr/>
-        </p:nvPicPr>
-        <p:blipFill rotWithShape="1">
-          <a:blip r:embed="rId2"/>
-          <a:srcRect t="5156" b="9287"/>
-          <a:stretch/>
-        </p:blipFill>
-        <p:spPr>
-          <a:xfrm>
-            <a:off x="1288026" y="1409967"/>
-            <a:ext cx="6567948" cy="4257367"/>
-          </a:xfrm>
-          <a:prstGeom prst="rect">
-            <a:avLst/>
-          </a:prstGeom>
-        </p:spPr>
-      </p:pic>
-      <p:sp>
-        <p:nvSpPr>
-          <p:cNvPr id="5" name="TextBox 4">
-            <a:extLst>
-              <a:ext uri="{FF2B5EF4-FFF2-40B4-BE49-F238E27FC236}">
-                <a16:creationId xmlns:a16="http://schemas.microsoft.com/office/drawing/2014/main" id="{F44CF722-A0AA-4589-8000-70FFC389879F}"/>
-              </a:ext>
-            </a:extLst>
-          </p:cNvPr>
-          <p:cNvSpPr txBox="1"/>
-          <p:nvPr/>
-        </p:nvSpPr>
-        <p:spPr>
-          <a:xfrm>
-            <a:off x="5073444" y="5667334"/>
-            <a:ext cx="2782530" cy="307777"/>
-          </a:xfrm>
-          <a:prstGeom prst="rect">
-            <a:avLst/>
-          </a:prstGeom>
-          <a:noFill/>
-        </p:spPr>
-        <p:txBody>
-          <a:bodyPr wrap="square" rtlCol="0">
-            <a:spAutoFit/>
-          </a:bodyPr>
-          <a:lstStyle/>
-          <a:p>
-            <a:r>
-              <a:rPr lang="en-US" i="1" dirty="0"/>
-              <a:t>A happy Kevin Courtney at work</a:t>
-            </a:r>
-          </a:p>
-        </p:txBody>
-      </p:sp>
-    </p:spTree>
-    <p:extLst>
-      <p:ext uri="{BB962C8B-B14F-4D97-AF65-F5344CB8AC3E}">
-        <p14:creationId xmlns:p14="http://schemas.microsoft.com/office/powerpoint/2010/main" val="2682030725"/>
-      </p:ext>
-    </p:extLst>
-  </p:cSld>
-  <p:clrMapOvr>
-    <a:masterClrMapping/>
-  </p:clrMapOvr>
-</p:sld>
-</file>
-
-<file path=ppt/slides/slide3.xml><?xml version="1.0" encoding="utf-8"?>
 <p:sld xmlns:a="http://schemas.openxmlformats.org/drawingml/2006/main" xmlns:r="http://schemas.openxmlformats.org/officeDocument/2006/relationships" xmlns:p="http://schemas.openxmlformats.org/presentationml/2006/main">
   <p:cSld>
     <p:spTree>
@@ -10667,7 +10022,7 @@
 </p:sld>
 </file>
 
-<file path=ppt/slides/slide4.xml><?xml version="1.0" encoding="utf-8"?>
+<file path=ppt/slides/slide3.xml><?xml version="1.0" encoding="utf-8"?>
 <p:sld xmlns:a="http://schemas.openxmlformats.org/drawingml/2006/main" xmlns:r="http://schemas.openxmlformats.org/officeDocument/2006/relationships" xmlns:p="http://schemas.openxmlformats.org/presentationml/2006/main">
   <p:cSld>
     <p:spTree>
@@ -10748,7 +10103,7 @@
             </a:pPr>
             <a:r>
               <a:rPr lang="en-US" sz="2000" dirty="0"/>
-              <a:t>Increase overall Python programming capabilities across the Thrivent analytics team</a:t>
+              <a:t>Increase overall Python programming</a:t>
             </a:r>
           </a:p>
           <a:p>
@@ -10762,7 +10117,7 @@
             </a:pPr>
             <a:r>
               <a:rPr lang="en-US" sz="2000" dirty="0"/>
-              <a:t>Identify areas of focus for analytics and model conversion as they relate to data science at Thrivent</a:t>
+              <a:t>Identify areas of focus for analytics and model conversion</a:t>
             </a:r>
           </a:p>
           <a:p>
@@ -10794,7 +10149,7 @@
 </p:sld>
 </file>
 
-<file path=ppt/slides/slide5.xml><?xml version="1.0" encoding="utf-8"?>
+<file path=ppt/slides/slide4.xml><?xml version="1.0" encoding="utf-8"?>
 <p:sld xmlns:a="http://schemas.openxmlformats.org/drawingml/2006/main" xmlns:r="http://schemas.openxmlformats.org/officeDocument/2006/relationships" xmlns:p="http://schemas.openxmlformats.org/presentationml/2006/main">
   <p:cSld>
     <p:spTree>
@@ -10846,10 +10201,10 @@
               <a:buNone/>
             </a:pPr>
             <a:r>
-              <a:rPr lang="en"/>
-              <a:t>Thrivent Financial - October 2018</a:t>
+              <a:rPr lang="en" dirty="0"/>
+              <a:t>October 2018</a:t>
             </a:r>
-            <a:endParaRPr/>
+            <a:endParaRPr dirty="0"/>
           </a:p>
         </p:txBody>
       </p:sp>
@@ -10920,7 +10275,7 @@
 </p:sld>
 </file>
 
-<file path=ppt/slides/slide6.xml><?xml version="1.0" encoding="utf-8"?>
+<file path=ppt/slides/slide5.xml><?xml version="1.0" encoding="utf-8"?>
 <p:sld xmlns:a="http://schemas.openxmlformats.org/drawingml/2006/main" xmlns:r="http://schemas.openxmlformats.org/officeDocument/2006/relationships" xmlns:p="http://schemas.openxmlformats.org/presentationml/2006/main">
   <p:cSld>
     <p:spTree>
@@ -11153,7 +10508,7 @@
 </p:sld>
 </file>
 
-<file path=ppt/slides/slide7.xml><?xml version="1.0" encoding="utf-8"?>
+<file path=ppt/slides/slide6.xml><?xml version="1.0" encoding="utf-8"?>
 <p:sld xmlns:a="http://schemas.openxmlformats.org/drawingml/2006/main" xmlns:r="http://schemas.openxmlformats.org/officeDocument/2006/relationships" xmlns:p="http://schemas.openxmlformats.org/presentationml/2006/main">
   <p:cSld>
     <p:spTree>
@@ -11286,7 +10641,7 @@
 </p:sld>
 </file>
 
-<file path=ppt/slides/slide8.xml><?xml version="1.0" encoding="utf-8"?>
+<file path=ppt/slides/slide7.xml><?xml version="1.0" encoding="utf-8"?>
 <p:sld xmlns:a="http://schemas.openxmlformats.org/drawingml/2006/main" xmlns:r="http://schemas.openxmlformats.org/officeDocument/2006/relationships" xmlns:p="http://schemas.openxmlformats.org/presentationml/2006/main">
   <p:cSld>
     <p:spTree>
@@ -11617,7 +10972,7 @@
 </p:sld>
 </file>
 
-<file path=ppt/slides/slide9.xml><?xml version="1.0" encoding="utf-8"?>
+<file path=ppt/slides/slide8.xml><?xml version="1.0" encoding="utf-8"?>
 <p:sld xmlns:a="http://schemas.openxmlformats.org/drawingml/2006/main" xmlns:r="http://schemas.openxmlformats.org/officeDocument/2006/relationships" xmlns:p="http://schemas.openxmlformats.org/presentationml/2006/main">
   <p:cSld>
     <p:spTree>
@@ -11780,6 +11135,267 @@
           </a:p>
         </p:txBody>
       </p:sp>
+    </p:spTree>
+  </p:cSld>
+  <p:clrMapOvr>
+    <a:masterClrMapping/>
+  </p:clrMapOvr>
+</p:sld>
+</file>
+
+<file path=ppt/slides/slide9.xml><?xml version="1.0" encoding="utf-8"?>
+<p:sld xmlns:a="http://schemas.openxmlformats.org/drawingml/2006/main" xmlns:r="http://schemas.openxmlformats.org/officeDocument/2006/relationships" xmlns:p="http://schemas.openxmlformats.org/presentationml/2006/main">
+  <p:cSld>
+    <p:spTree>
+      <p:nvGrpSpPr>
+        <p:cNvPr id="1" name="Shape 87"/>
+        <p:cNvGrpSpPr/>
+        <p:nvPr/>
+      </p:nvGrpSpPr>
+      <p:grpSpPr>
+        <a:xfrm>
+          <a:off x="0" y="0"/>
+          <a:ext cx="0" cy="0"/>
+          <a:chOff x="0" y="0"/>
+          <a:chExt cx="0" cy="0"/>
+        </a:xfrm>
+      </p:grpSpPr>
+      <p:sp>
+        <p:nvSpPr>
+          <p:cNvPr id="88" name="Google Shape;88;p18"/>
+          <p:cNvSpPr txBox="1">
+            <a:spLocks noGrp="1"/>
+          </p:cNvSpPr>
+          <p:nvPr>
+            <p:ph type="body" idx="1"/>
+          </p:nvPr>
+        </p:nvSpPr>
+        <p:spPr>
+          <a:xfrm>
+            <a:off x="311700" y="1638233"/>
+            <a:ext cx="8520600" cy="4453500"/>
+          </a:xfrm>
+          <a:prstGeom prst="rect">
+            <a:avLst/>
+          </a:prstGeom>
+        </p:spPr>
+        <p:txBody>
+          <a:bodyPr spcFirstLastPara="1" wrap="square" lIns="91425" tIns="91425" rIns="91425" bIns="91425" anchor="t" anchorCtr="0">
+            <a:noAutofit/>
+          </a:bodyPr>
+          <a:lstStyle/>
+          <a:p>
+            <a:pPr marL="457200" lvl="0" indent="-342900" algn="l" rtl="0">
+              <a:spcBef>
+                <a:spcPts val="0"/>
+              </a:spcBef>
+              <a:spcAft>
+                <a:spcPts val="0"/>
+              </a:spcAft>
+              <a:buSzPts val="1800"/>
+              <a:buChar char="●"/>
+            </a:pPr>
+            <a:r>
+              <a:rPr lang="en"/>
+              <a:t>Like most open-source programming languages, there are many libraries written and supported for Python. </a:t>
+            </a:r>
+            <a:endParaRPr/>
+          </a:p>
+          <a:p>
+            <a:pPr marL="457200" lvl="0" indent="-342900" algn="l" rtl="0">
+              <a:spcBef>
+                <a:spcPts val="1000"/>
+              </a:spcBef>
+              <a:spcAft>
+                <a:spcPts val="0"/>
+              </a:spcAft>
+              <a:buSzPts val="1800"/>
+              <a:buChar char="●"/>
+            </a:pPr>
+            <a:r>
+              <a:rPr lang="en"/>
+              <a:t>Be careful with library version numbers for compatibility when sharing code and working in teams.</a:t>
+            </a:r>
+            <a:endParaRPr/>
+          </a:p>
+          <a:p>
+            <a:pPr marL="457200" lvl="0" indent="-342900" algn="l" rtl="0">
+              <a:spcBef>
+                <a:spcPts val="1000"/>
+              </a:spcBef>
+              <a:spcAft>
+                <a:spcPts val="0"/>
+              </a:spcAft>
+              <a:buSzPts val="1800"/>
+              <a:buChar char="●"/>
+            </a:pPr>
+            <a:r>
+              <a:rPr lang="en"/>
+              <a:t>You can use `pip freeze` to get a list of all libraries loaded and their version numbers</a:t>
+            </a:r>
+            <a:endParaRPr/>
+          </a:p>
+          <a:p>
+            <a:pPr marL="457200" lvl="0" indent="-342900" algn="l" rtl="0">
+              <a:spcBef>
+                <a:spcPts val="1000"/>
+              </a:spcBef>
+              <a:spcAft>
+                <a:spcPts val="0"/>
+              </a:spcAft>
+              <a:buSzPts val="1800"/>
+              <a:buChar char="●"/>
+            </a:pPr>
+            <a:r>
+              <a:rPr lang="en"/>
+              <a:t>Use Python environments to work with projects that have references to different library versions</a:t>
+            </a:r>
+            <a:endParaRPr/>
+          </a:p>
+          <a:p>
+            <a:pPr marL="457200" lvl="0" indent="-342900" algn="l" rtl="0">
+              <a:spcBef>
+                <a:spcPts val="1000"/>
+              </a:spcBef>
+              <a:spcAft>
+                <a:spcPts val="0"/>
+              </a:spcAft>
+              <a:buSzPts val="1800"/>
+              <a:buChar char="●"/>
+            </a:pPr>
+            <a:r>
+              <a:rPr lang="en"/>
+              <a:t>The Anaconda Distribution automatically installs the most commonly used data science packages:</a:t>
+            </a:r>
+            <a:endParaRPr/>
+          </a:p>
+          <a:p>
+            <a:pPr marL="914400" lvl="1" indent="-317500" algn="l" rtl="0">
+              <a:spcBef>
+                <a:spcPts val="1000"/>
+              </a:spcBef>
+              <a:spcAft>
+                <a:spcPts val="0"/>
+              </a:spcAft>
+              <a:buSzPts val="1400"/>
+              <a:buChar char="○"/>
+            </a:pPr>
+            <a:r>
+              <a:rPr lang="en"/>
+              <a:t>567 packages, according to the </a:t>
+            </a:r>
+            <a:r>
+              <a:rPr lang="en" u="sng">
+                <a:solidFill>
+                  <a:schemeClr val="hlink"/>
+                </a:solidFill>
+                <a:hlinkClick r:id="rId3"/>
+              </a:rPr>
+              <a:t>Anaconda website</a:t>
+            </a:r>
+            <a:endParaRPr/>
+          </a:p>
+          <a:p>
+            <a:pPr marL="914400" lvl="1" indent="-317500" algn="l" rtl="0">
+              <a:spcBef>
+                <a:spcPts val="1000"/>
+              </a:spcBef>
+              <a:spcAft>
+                <a:spcPts val="0"/>
+              </a:spcAft>
+              <a:buSzPts val="1400"/>
+              <a:buChar char="○"/>
+            </a:pPr>
+            <a:r>
+              <a:rPr lang="en"/>
+              <a:t>215 packages, according to my own `pip freeze` results</a:t>
+            </a:r>
+            <a:endParaRPr/>
+          </a:p>
+          <a:p>
+            <a:pPr marL="0" lvl="0" indent="0" algn="l" rtl="0">
+              <a:spcBef>
+                <a:spcPts val="1000"/>
+              </a:spcBef>
+              <a:spcAft>
+                <a:spcPts val="1000"/>
+              </a:spcAft>
+              <a:buNone/>
+            </a:pPr>
+            <a:endParaRPr/>
+          </a:p>
+        </p:txBody>
+      </p:sp>
+      <p:sp>
+        <p:nvSpPr>
+          <p:cNvPr id="89" name="Google Shape;89;p18"/>
+          <p:cNvSpPr txBox="1">
+            <a:spLocks noGrp="1"/>
+          </p:cNvSpPr>
+          <p:nvPr>
+            <p:ph type="title"/>
+          </p:nvPr>
+        </p:nvSpPr>
+        <p:spPr>
+          <a:xfrm>
+            <a:off x="311700" y="390467"/>
+            <a:ext cx="8520600" cy="1068000"/>
+          </a:xfrm>
+          <a:prstGeom prst="rect">
+            <a:avLst/>
+          </a:prstGeom>
+        </p:spPr>
+        <p:txBody>
+          <a:bodyPr spcFirstLastPara="1" wrap="square" lIns="91425" tIns="91425" rIns="91425" bIns="91425" anchor="t" anchorCtr="0">
+            <a:noAutofit/>
+          </a:bodyPr>
+          <a:lstStyle/>
+          <a:p>
+            <a:pPr marL="0" lvl="0" indent="0" algn="l" rtl="0">
+              <a:spcBef>
+                <a:spcPts val="0"/>
+              </a:spcBef>
+              <a:spcAft>
+                <a:spcPts val="0"/>
+              </a:spcAft>
+              <a:buNone/>
+            </a:pPr>
+            <a:r>
+              <a:rPr lang="en"/>
+              <a:t>Libraries</a:t>
+            </a:r>
+            <a:endParaRPr/>
+          </a:p>
+        </p:txBody>
+      </p:sp>
+      <p:pic>
+        <p:nvPicPr>
+          <p:cNvPr id="90" name="Google Shape;90;p18"/>
+          <p:cNvPicPr preferRelativeResize="0"/>
+          <p:nvPr/>
+        </p:nvPicPr>
+        <p:blipFill>
+          <a:blip r:embed="rId4">
+            <a:alphaModFix/>
+          </a:blip>
+          <a:stretch>
+            <a:fillRect/>
+          </a:stretch>
+        </p:blipFill>
+        <p:spPr>
+          <a:xfrm>
+            <a:off x="6847540" y="149450"/>
+            <a:ext cx="1561901" cy="1530025"/>
+          </a:xfrm>
+          <a:prstGeom prst="rect">
+            <a:avLst/>
+          </a:prstGeom>
+          <a:noFill/>
+          <a:ln>
+            <a:noFill/>
+          </a:ln>
+        </p:spPr>
+      </p:pic>
     </p:spTree>
   </p:cSld>
   <p:clrMapOvr>

</xml_diff>